<commit_message>
doc: 2020-02-14 공부한 내용 추가
</commit_message>
<xml_diff>
--- a/documents/팀프로젝트/기획/1조 기획서_after_feedback_001.pptx
+++ b/documents/팀프로젝트/기획/1조 기획서_after_feedback_001.pptx
@@ -13,10 +13,8 @@
     <p:sldId id="270" r:id="rId7"/>
     <p:sldId id="261" r:id="rId8"/>
     <p:sldId id="271" r:id="rId9"/>
-    <p:sldId id="273" r:id="rId10"/>
-    <p:sldId id="276" r:id="rId11"/>
-    <p:sldId id="278" r:id="rId12"/>
-    <p:sldId id="265" r:id="rId13"/>
+    <p:sldId id="278" r:id="rId10"/>
+    <p:sldId id="265" r:id="rId11"/>
   </p:sldIdLst>
   <p:sldSz cx="12192000" cy="6858000"/>
   <p:notesSz cx="6858000" cy="9144000"/>
@@ -117,7 +115,7 @@
   </p:defaultTextStyle>
   <p:extLst>
     <p:ext uri="{EFAFB233-063F-42B5-8137-9DF3F51BA10A}">
-      <p15:sldGuideLst xmlns="" xmlns:p15="http://schemas.microsoft.com/office/powerpoint/2012/main">
+      <p15:sldGuideLst xmlns:p15="http://schemas.microsoft.com/office/powerpoint/2012/main" xmlns="">
         <p15:guide id="1" orient="horz" pos="2160">
           <p15:clr>
             <a:srgbClr val="A4A3A4"/>
@@ -139,7 +137,7 @@
   <p:cmAuthor id="1" name="Kim Hyeonuk" initials="KH" lastIdx="1" clrIdx="0">
     <p:extLst>
       <p:ext uri="{19B8F6BF-5375-455C-9EA6-DF929625EA0E}">
-        <p15:presenceInfo xmlns="" xmlns:p15="http://schemas.microsoft.com/office/powerpoint/2012/main" userId="263b8329c14079f8" providerId="Windows Live"/>
+        <p15:presenceInfo xmlns:p15="http://schemas.microsoft.com/office/powerpoint/2012/main" xmlns="" userId="263b8329c14079f8" providerId="Windows Live"/>
       </p:ext>
     </p:extLst>
   </p:cmAuthor>
@@ -437,11 +435,11 @@
         </c:dLbls>
         <c:gapWidth val="94"/>
         <c:overlap val="-10"/>
-        <c:axId val="31531520"/>
-        <c:axId val="4148608"/>
+        <c:axId val="87024640"/>
+        <c:axId val="40074560"/>
       </c:barChart>
       <c:catAx>
-        <c:axId val="31531520"/>
+        <c:axId val="87024640"/>
         <c:scaling>
           <c:orientation val="minMax"/>
         </c:scaling>
@@ -476,7 +474,7 @@
             <a:endParaRPr lang="ko-KR"/>
           </a:p>
         </c:txPr>
-        <c:crossAx val="4148608"/>
+        <c:crossAx val="40074560"/>
         <c:crosses val="autoZero"/>
         <c:auto val="1"/>
         <c:lblAlgn val="ctr"/>
@@ -484,7 +482,7 @@
         <c:noMultiLvlLbl val="0"/>
       </c:catAx>
       <c:valAx>
-        <c:axId val="4148608"/>
+        <c:axId val="40074560"/>
         <c:scaling>
           <c:orientation val="minMax"/>
         </c:scaling>
@@ -494,7 +492,7 @@
         <c:majorTickMark val="none"/>
         <c:minorTickMark val="none"/>
         <c:tickLblPos val="nextTo"/>
-        <c:crossAx val="31531520"/>
+        <c:crossAx val="87024640"/>
         <c:crosses val="autoZero"/>
         <c:crossBetween val="between"/>
       </c:valAx>
@@ -675,7 +673,7 @@
                 </a:solidFill>
               </a:rPr>
               <a:pPr/>
-              <a:t>2020-02-10</a:t>
+              <a:t>2020-02-14</a:t>
             </a:fld>
             <a:endParaRPr lang="ko-KR" altLang="en-US">
               <a:solidFill>
@@ -875,7 +873,7 @@
                 </a:solidFill>
               </a:rPr>
               <a:pPr/>
-              <a:t>2020-02-10</a:t>
+              <a:t>2020-02-14</a:t>
             </a:fld>
             <a:endParaRPr lang="ko-KR" altLang="en-US">
               <a:solidFill>
@@ -1085,7 +1083,7 @@
                 </a:solidFill>
               </a:rPr>
               <a:pPr/>
-              <a:t>2020-02-10</a:t>
+              <a:t>2020-02-14</a:t>
             </a:fld>
             <a:endParaRPr lang="ko-KR" altLang="en-US">
               <a:solidFill>
@@ -1285,7 +1283,7 @@
                 </a:solidFill>
               </a:rPr>
               <a:pPr/>
-              <a:t>2020-02-10</a:t>
+              <a:t>2020-02-14</a:t>
             </a:fld>
             <a:endParaRPr lang="ko-KR" altLang="en-US">
               <a:solidFill>
@@ -1562,7 +1560,7 @@
                 </a:solidFill>
               </a:rPr>
               <a:pPr/>
-              <a:t>2020-02-10</a:t>
+              <a:t>2020-02-14</a:t>
             </a:fld>
             <a:endParaRPr lang="ko-KR" altLang="en-US">
               <a:solidFill>
@@ -1823,7 +1821,7 @@
                 </a:solidFill>
               </a:rPr>
               <a:pPr/>
-              <a:t>2020-02-10</a:t>
+              <a:t>2020-02-14</a:t>
             </a:fld>
             <a:endParaRPr lang="ko-KR" altLang="en-US">
               <a:solidFill>
@@ -2219,7 +2217,7 @@
                 </a:solidFill>
               </a:rPr>
               <a:pPr/>
-              <a:t>2020-02-10</a:t>
+              <a:t>2020-02-14</a:t>
             </a:fld>
             <a:endParaRPr lang="ko-KR" altLang="en-US">
               <a:solidFill>
@@ -2368,7 +2366,7 @@
                 </a:solidFill>
               </a:rPr>
               <a:pPr/>
-              <a:t>2020-02-10</a:t>
+              <a:t>2020-02-14</a:t>
             </a:fld>
             <a:endParaRPr lang="ko-KR" altLang="en-US">
               <a:solidFill>
@@ -2495,7 +2493,7 @@
                 </a:solidFill>
               </a:rPr>
               <a:pPr/>
-              <a:t>2020-02-10</a:t>
+              <a:t>2020-02-14</a:t>
             </a:fld>
             <a:endParaRPr lang="ko-KR" altLang="en-US">
               <a:solidFill>
@@ -2802,7 +2800,7 @@
                 </a:solidFill>
               </a:rPr>
               <a:pPr/>
-              <a:t>2020-02-10</a:t>
+              <a:t>2020-02-14</a:t>
             </a:fld>
             <a:endParaRPr lang="ko-KR" altLang="en-US">
               <a:solidFill>
@@ -3086,7 +3084,7 @@
                 </a:solidFill>
               </a:rPr>
               <a:pPr/>
-              <a:t>2020-02-10</a:t>
+              <a:t>2020-02-14</a:t>
             </a:fld>
             <a:endParaRPr lang="ko-KR" altLang="en-US">
               <a:solidFill>
@@ -3329,7 +3327,7 @@
                 </a:solidFill>
               </a:rPr>
               <a:pPr/>
-              <a:t>2020-02-10</a:t>
+              <a:t>2020-02-14</a:t>
             </a:fld>
             <a:endParaRPr lang="ko-KR" altLang="en-US">
               <a:solidFill>
@@ -4079,391 +4077,6 @@
 <file path=ppt/slides/slide10.xml><?xml version="1.0" encoding="utf-8"?>
 <p:sld xmlns:a="http://schemas.openxmlformats.org/drawingml/2006/main" xmlns:r="http://schemas.openxmlformats.org/officeDocument/2006/relationships" xmlns:p="http://schemas.openxmlformats.org/presentationml/2006/main">
   <p:cSld>
-    <p:bg>
-      <p:bgPr>
-        <a:solidFill>
-          <a:srgbClr val="2E2E31"/>
-        </a:solidFill>
-        <a:effectLst/>
-      </p:bgPr>
-    </p:bg>
-    <p:spTree>
-      <p:nvGrpSpPr>
-        <p:cNvPr id="1" name=""/>
-        <p:cNvGrpSpPr/>
-        <p:nvPr/>
-      </p:nvGrpSpPr>
-      <p:grpSpPr>
-        <a:xfrm>
-          <a:off x="0" y="0"/>
-          <a:ext cx="0" cy="0"/>
-          <a:chOff x="0" y="0"/>
-          <a:chExt cx="0" cy="0"/>
-        </a:xfrm>
-      </p:grpSpPr>
-      <p:cxnSp>
-        <p:nvCxnSpPr>
-          <p:cNvPr id="22" name="직선 연결선 21">
-            <a:extLst>
-              <a:ext uri="{FF2B5EF4-FFF2-40B4-BE49-F238E27FC236}">
-                <a16:creationId xmlns="" xmlns:a16="http://schemas.microsoft.com/office/drawing/2014/main" id="{C62365F4-5F94-4454-A156-220929408803}"/>
-              </a:ext>
-            </a:extLst>
-          </p:cNvPr>
-          <p:cNvCxnSpPr/>
-          <p:nvPr/>
-        </p:nvCxnSpPr>
-        <p:spPr>
-          <a:xfrm>
-            <a:off x="1491048" y="706056"/>
-            <a:ext cx="9252000" cy="0"/>
-          </a:xfrm>
-          <a:prstGeom prst="line">
-            <a:avLst/>
-          </a:prstGeom>
-          <a:ln w="47625">
-            <a:solidFill>
-              <a:srgbClr val="E8C193"/>
-            </a:solidFill>
-            <a:prstDash val="sysDot"/>
-            <a:headEnd type="diamond" w="lg" len="lg"/>
-            <a:tailEnd type="diamond" w="lg" len="lg"/>
-          </a:ln>
-        </p:spPr>
-        <p:style>
-          <a:lnRef idx="1">
-            <a:schemeClr val="accent1"/>
-          </a:lnRef>
-          <a:fillRef idx="0">
-            <a:schemeClr val="accent1"/>
-          </a:fillRef>
-          <a:effectRef idx="0">
-            <a:schemeClr val="accent1"/>
-          </a:effectRef>
-          <a:fontRef idx="minor">
-            <a:schemeClr val="tx1"/>
-          </a:fontRef>
-        </p:style>
-      </p:cxnSp>
-      <p:sp>
-        <p:nvSpPr>
-          <p:cNvPr id="78" name="직사각형 77">
-            <a:extLst>
-              <a:ext uri="{FF2B5EF4-FFF2-40B4-BE49-F238E27FC236}">
-                <a16:creationId xmlns="" xmlns:a16="http://schemas.microsoft.com/office/drawing/2014/main" id="{DD3AC29C-926C-4989-B8B2-DCEAE44D6EB0}"/>
-              </a:ext>
-            </a:extLst>
-          </p:cNvPr>
-          <p:cNvSpPr/>
-          <p:nvPr/>
-        </p:nvSpPr>
-        <p:spPr>
-          <a:xfrm>
-            <a:off x="3069048" y="180468"/>
-            <a:ext cx="6096000" cy="977127"/>
-          </a:xfrm>
-          <a:prstGeom prst="rect">
-            <a:avLst/>
-          </a:prstGeom>
-          <a:solidFill>
-            <a:srgbClr val="2E2E31"/>
-          </a:solidFill>
-        </p:spPr>
-        <p:txBody>
-          <a:bodyPr>
-            <a:spAutoFit/>
-          </a:bodyPr>
-          <a:lstStyle/>
-          <a:p>
-            <a:pPr algn="ctr" latinLnBrk="0">
-              <a:lnSpc>
-                <a:spcPct val="150000"/>
-              </a:lnSpc>
-              <a:defRPr/>
-            </a:pPr>
-            <a:r>
-              <a:rPr lang="ko-KR" altLang="en-US" sz="4400" b="1" kern="0" dirty="0">
-                <a:solidFill>
-                  <a:srgbClr val="E8C193"/>
-                </a:solidFill>
-              </a:rPr>
-              <a:t>목표</a:t>
-            </a:r>
-            <a:r>
-              <a:rPr lang="en-US" altLang="ko-KR" sz="1600" b="1" kern="0" dirty="0">
-                <a:solidFill>
-                  <a:srgbClr val="E8C193"/>
-                </a:solidFill>
-              </a:rPr>
-              <a:t>1/1</a:t>
-            </a:r>
-            <a:endParaRPr lang="ko-KR" altLang="en-US" sz="11500" b="1" kern="0" dirty="0">
-              <a:solidFill>
-                <a:srgbClr val="E8C193"/>
-              </a:solidFill>
-            </a:endParaRPr>
-          </a:p>
-        </p:txBody>
-      </p:sp>
-      <p:sp>
-        <p:nvSpPr>
-          <p:cNvPr id="21" name="TextBox 20">
-            <a:extLst>
-              <a:ext uri="{FF2B5EF4-FFF2-40B4-BE49-F238E27FC236}">
-                <a16:creationId xmlns="" xmlns:a16="http://schemas.microsoft.com/office/drawing/2014/main" id="{7E2061A0-C4C7-49CB-8E88-C6579FAD5CCF}"/>
-              </a:ext>
-            </a:extLst>
-          </p:cNvPr>
-          <p:cNvSpPr txBox="1"/>
-          <p:nvPr/>
-        </p:nvSpPr>
-        <p:spPr>
-          <a:xfrm>
-            <a:off x="620766" y="1214975"/>
-            <a:ext cx="9996927" cy="646331"/>
-          </a:xfrm>
-          <a:prstGeom prst="rect">
-            <a:avLst/>
-          </a:prstGeom>
-          <a:noFill/>
-        </p:spPr>
-        <p:txBody>
-          <a:bodyPr wrap="square" rtlCol="0">
-            <a:spAutoFit/>
-          </a:bodyPr>
-          <a:lstStyle/>
-          <a:p>
-            <a:r>
-              <a:rPr lang="en-US" altLang="ko-KR" sz="3600" dirty="0" smtClean="0">
-                <a:solidFill>
-                  <a:srgbClr val="E8C193"/>
-                </a:solidFill>
-              </a:rPr>
-              <a:t>3. </a:t>
-            </a:r>
-            <a:r>
-              <a:rPr lang="ko-KR" altLang="en-US" sz="3600" dirty="0" smtClean="0">
-                <a:solidFill>
-                  <a:srgbClr val="E8C193"/>
-                </a:solidFill>
-              </a:rPr>
-              <a:t>수업진도 </a:t>
-            </a:r>
-            <a:r>
-              <a:rPr lang="ko-KR" altLang="en-US" sz="3600" dirty="0" smtClean="0">
-                <a:solidFill>
-                  <a:srgbClr val="E8C193"/>
-                </a:solidFill>
-              </a:rPr>
-              <a:t>진행도 </a:t>
-            </a:r>
-            <a:endParaRPr lang="ko-KR" altLang="en-US" sz="3600" dirty="0">
-              <a:solidFill>
-                <a:srgbClr val="E8C193"/>
-              </a:solidFill>
-            </a:endParaRPr>
-          </a:p>
-        </p:txBody>
-      </p:sp>
-      <p:pic>
-        <p:nvPicPr>
-          <p:cNvPr id="2" name="그림 1">
-            <a:extLst>
-              <a:ext uri="{FF2B5EF4-FFF2-40B4-BE49-F238E27FC236}">
-                <a16:creationId xmlns="" xmlns:a16="http://schemas.microsoft.com/office/drawing/2014/main" id="{18C7C16F-98AE-4D2C-B460-44AF64F79F88}"/>
-              </a:ext>
-            </a:extLst>
-          </p:cNvPr>
-          <p:cNvPicPr>
-            <a:picLocks noChangeAspect="1"/>
-          </p:cNvPicPr>
-          <p:nvPr/>
-        </p:nvPicPr>
-        <p:blipFill>
-          <a:blip r:embed="rId2"/>
-          <a:stretch>
-            <a:fillRect/>
-          </a:stretch>
-        </p:blipFill>
-        <p:spPr>
-          <a:xfrm>
-            <a:off x="1989599" y="2007586"/>
-            <a:ext cx="8181975" cy="4572000"/>
-          </a:xfrm>
-          <a:prstGeom prst="rect">
-            <a:avLst/>
-          </a:prstGeom>
-          <a:ln>
-            <a:solidFill>
-              <a:schemeClr val="tx1"/>
-            </a:solidFill>
-          </a:ln>
-        </p:spPr>
-      </p:pic>
-    </p:spTree>
-    <p:extLst>
-      <p:ext uri="{BB962C8B-B14F-4D97-AF65-F5344CB8AC3E}">
-        <p14:creationId xmlns:p14="http://schemas.microsoft.com/office/powerpoint/2010/main" val="3320093374"/>
-      </p:ext>
-    </p:extLst>
-  </p:cSld>
-  <p:clrMapOvr>
-    <a:masterClrMapping/>
-  </p:clrMapOvr>
-  <p:timing>
-    <p:tnLst>
-      <p:par>
-        <p:cTn id="1" dur="indefinite" restart="never" nodeType="tmRoot"/>
-      </p:par>
-    </p:tnLst>
-  </p:timing>
-</p:sld>
-</file>
-
-<file path=ppt/slides/slide11.xml><?xml version="1.0" encoding="utf-8"?>
-<p:sld xmlns:a="http://schemas.openxmlformats.org/drawingml/2006/main" xmlns:r="http://schemas.openxmlformats.org/officeDocument/2006/relationships" xmlns:p="http://schemas.openxmlformats.org/presentationml/2006/main">
-  <p:cSld>
-    <p:bg>
-      <p:bgPr>
-        <a:solidFill>
-          <a:srgbClr val="2E2E31"/>
-        </a:solidFill>
-        <a:effectLst/>
-      </p:bgPr>
-    </p:bg>
-    <p:spTree>
-      <p:nvGrpSpPr>
-        <p:cNvPr id="1" name=""/>
-        <p:cNvGrpSpPr/>
-        <p:nvPr/>
-      </p:nvGrpSpPr>
-      <p:grpSpPr>
-        <a:xfrm>
-          <a:off x="0" y="0"/>
-          <a:ext cx="0" cy="0"/>
-          <a:chOff x="0" y="0"/>
-          <a:chExt cx="0" cy="0"/>
-        </a:xfrm>
-      </p:grpSpPr>
-      <p:cxnSp>
-        <p:nvCxnSpPr>
-          <p:cNvPr id="22" name="직선 연결선 21">
-            <a:extLst>
-              <a:ext uri="{FF2B5EF4-FFF2-40B4-BE49-F238E27FC236}">
-                <a16:creationId xmlns="" xmlns:a16="http://schemas.microsoft.com/office/drawing/2014/main" id="{C62365F4-5F94-4454-A156-220929408803}"/>
-              </a:ext>
-            </a:extLst>
-          </p:cNvPr>
-          <p:cNvCxnSpPr/>
-          <p:nvPr/>
-        </p:nvCxnSpPr>
-        <p:spPr>
-          <a:xfrm>
-            <a:off x="1491048" y="706056"/>
-            <a:ext cx="9252000" cy="0"/>
-          </a:xfrm>
-          <a:prstGeom prst="line">
-            <a:avLst/>
-          </a:prstGeom>
-          <a:ln w="47625">
-            <a:solidFill>
-              <a:srgbClr val="E8C193"/>
-            </a:solidFill>
-            <a:prstDash val="sysDot"/>
-            <a:headEnd type="diamond" w="lg" len="lg"/>
-            <a:tailEnd type="diamond" w="lg" len="lg"/>
-          </a:ln>
-        </p:spPr>
-        <p:style>
-          <a:lnRef idx="1">
-            <a:schemeClr val="accent1"/>
-          </a:lnRef>
-          <a:fillRef idx="0">
-            <a:schemeClr val="accent1"/>
-          </a:fillRef>
-          <a:effectRef idx="0">
-            <a:schemeClr val="accent1"/>
-          </a:effectRef>
-          <a:fontRef idx="minor">
-            <a:schemeClr val="tx1"/>
-          </a:fontRef>
-        </p:style>
-      </p:cxnSp>
-      <p:sp>
-        <p:nvSpPr>
-          <p:cNvPr id="78" name="직사각형 77">
-            <a:extLst>
-              <a:ext uri="{FF2B5EF4-FFF2-40B4-BE49-F238E27FC236}">
-                <a16:creationId xmlns="" xmlns:a16="http://schemas.microsoft.com/office/drawing/2014/main" id="{DD3AC29C-926C-4989-B8B2-DCEAE44D6EB0}"/>
-              </a:ext>
-            </a:extLst>
-          </p:cNvPr>
-          <p:cNvSpPr/>
-          <p:nvPr/>
-        </p:nvSpPr>
-        <p:spPr>
-          <a:xfrm>
-            <a:off x="3069048" y="180468"/>
-            <a:ext cx="6096000" cy="977127"/>
-          </a:xfrm>
-          <a:prstGeom prst="rect">
-            <a:avLst/>
-          </a:prstGeom>
-          <a:solidFill>
-            <a:srgbClr val="2E2E31"/>
-          </a:solidFill>
-        </p:spPr>
-        <p:txBody>
-          <a:bodyPr>
-            <a:spAutoFit/>
-          </a:bodyPr>
-          <a:lstStyle/>
-          <a:p>
-            <a:pPr algn="ctr" latinLnBrk="0">
-              <a:lnSpc>
-                <a:spcPct val="150000"/>
-              </a:lnSpc>
-              <a:defRPr/>
-            </a:pPr>
-            <a:r>
-              <a:rPr lang="en-US" altLang="ko-KR" sz="4400" b="1" kern="0" dirty="0">
-                <a:solidFill>
-                  <a:srgbClr val="E8C193"/>
-                </a:solidFill>
-              </a:rPr>
-              <a:t>Q &amp; A</a:t>
-            </a:r>
-            <a:endParaRPr lang="ko-KR" altLang="en-US" sz="11500" b="1" kern="0" dirty="0">
-              <a:solidFill>
-                <a:srgbClr val="E8C193"/>
-              </a:solidFill>
-            </a:endParaRPr>
-          </a:p>
-        </p:txBody>
-      </p:sp>
-    </p:spTree>
-    <p:extLst>
-      <p:ext uri="{BB962C8B-B14F-4D97-AF65-F5344CB8AC3E}">
-        <p14:creationId xmlns:p14="http://schemas.microsoft.com/office/powerpoint/2010/main" val="4227714645"/>
-      </p:ext>
-    </p:extLst>
-  </p:cSld>
-  <p:clrMapOvr>
-    <a:masterClrMapping/>
-  </p:clrMapOvr>
-  <p:timing>
-    <p:tnLst>
-      <p:par>
-        <p:cTn id="1" dur="indefinite" restart="never" nodeType="tmRoot"/>
-      </p:par>
-    </p:tnLst>
-  </p:timing>
-</p:sld>
-</file>
-
-<file path=ppt/slides/slide12.xml><?xml version="1.0" encoding="utf-8"?>
-<p:sld xmlns:a="http://schemas.openxmlformats.org/drawingml/2006/main" xmlns:r="http://schemas.openxmlformats.org/officeDocument/2006/relationships" xmlns:p="http://schemas.openxmlformats.org/presentationml/2006/main">
-  <p:cSld>
     <p:spTree>
       <p:nvGrpSpPr>
         <p:cNvPr id="1" name=""/>
@@ -4750,7 +4363,7 @@
           <p:cNvPr id="3" name="내용 개체 틀 2">
             <a:extLst>
               <a:ext uri="{FF2B5EF4-FFF2-40B4-BE49-F238E27FC236}">
-                <a16:creationId xmlns="" xmlns:a16="http://schemas.microsoft.com/office/drawing/2014/main" id="{30B50125-38D3-4EE5-9D7E-AD1E14278942}"/>
+                <a16:creationId xmlns:a16="http://schemas.microsoft.com/office/drawing/2014/main" xmlns="" id="{30B50125-38D3-4EE5-9D7E-AD1E14278942}"/>
               </a:ext>
             </a:extLst>
           </p:cNvPr>
@@ -4838,7 +4451,7 @@
           <p:cNvPr id="4" name="직사각형 3">
             <a:extLst>
               <a:ext uri="{FF2B5EF4-FFF2-40B4-BE49-F238E27FC236}">
-                <a16:creationId xmlns="" xmlns:a16="http://schemas.microsoft.com/office/drawing/2014/main" id="{FD021BAB-FD04-4932-A92E-6A07A5973470}"/>
+                <a16:creationId xmlns:a16="http://schemas.microsoft.com/office/drawing/2014/main" xmlns="" id="{FD021BAB-FD04-4932-A92E-6A07A5973470}"/>
               </a:ext>
             </a:extLst>
           </p:cNvPr>
@@ -5561,7 +5174,7 @@
           <p:cNvPr id="14" name="직사각형 13">
             <a:extLst>
               <a:ext uri="{FF2B5EF4-FFF2-40B4-BE49-F238E27FC236}">
-                <a16:creationId xmlns="" xmlns:a16="http://schemas.microsoft.com/office/drawing/2014/main" id="{13CAAE4C-302E-4C94-A78C-722268990DF6}"/>
+                <a16:creationId xmlns:a16="http://schemas.microsoft.com/office/drawing/2014/main" xmlns="" id="{13CAAE4C-302E-4C94-A78C-722268990DF6}"/>
               </a:ext>
             </a:extLst>
           </p:cNvPr>
@@ -5781,7 +5394,7 @@
           <p:cNvPr id="16" name="TextBox 15">
             <a:extLst>
               <a:ext uri="{FF2B5EF4-FFF2-40B4-BE49-F238E27FC236}">
-                <a16:creationId xmlns="" xmlns:a16="http://schemas.microsoft.com/office/drawing/2014/main" id="{4930FF33-9106-48EC-B0C6-414B839FFA0F}"/>
+                <a16:creationId xmlns:a16="http://schemas.microsoft.com/office/drawing/2014/main" xmlns="" id="{4930FF33-9106-48EC-B0C6-414B839FFA0F}"/>
               </a:ext>
             </a:extLst>
           </p:cNvPr>
@@ -5873,7 +5486,7 @@
           <p:cNvPr id="68" name="직선 연결선 67">
             <a:extLst>
               <a:ext uri="{FF2B5EF4-FFF2-40B4-BE49-F238E27FC236}">
-                <a16:creationId xmlns="" xmlns:a16="http://schemas.microsoft.com/office/drawing/2014/main" id="{9E7B134C-FC40-4679-B73C-C6D704D5EF3C}"/>
+                <a16:creationId xmlns:a16="http://schemas.microsoft.com/office/drawing/2014/main" xmlns="" id="{9E7B134C-FC40-4679-B73C-C6D704D5EF3C}"/>
               </a:ext>
             </a:extLst>
           </p:cNvPr>
@@ -5917,7 +5530,7 @@
           <p:cNvPr id="1026" name="Picture 2" descr="프로그래머, 프로그래밍, 코드, 일, 컴퓨터, 인터넷, 기술, 코딩, 키보드, 노트북, 온라인">
             <a:extLst>
               <a:ext uri="{FF2B5EF4-FFF2-40B4-BE49-F238E27FC236}">
-                <a16:creationId xmlns="" xmlns:a16="http://schemas.microsoft.com/office/drawing/2014/main" id="{88459E38-CC78-4D13-86D7-895922A5CE52}"/>
+                <a16:creationId xmlns:a16="http://schemas.microsoft.com/office/drawing/2014/main" xmlns="" id="{88459E38-CC78-4D13-86D7-895922A5CE52}"/>
               </a:ext>
             </a:extLst>
           </p:cNvPr>
@@ -5978,7 +5591,7 @@
           <p:cNvPr id="25" name="타원 24">
             <a:extLst>
               <a:ext uri="{FF2B5EF4-FFF2-40B4-BE49-F238E27FC236}">
-                <a16:creationId xmlns="" xmlns:a16="http://schemas.microsoft.com/office/drawing/2014/main" id="{D80E5030-35EB-4E76-8503-A04A6062F71E}"/>
+                <a16:creationId xmlns:a16="http://schemas.microsoft.com/office/drawing/2014/main" xmlns="" id="{D80E5030-35EB-4E76-8503-A04A6062F71E}"/>
               </a:ext>
             </a:extLst>
           </p:cNvPr>
@@ -6030,7 +5643,7 @@
           <p:cNvPr id="1028" name="Picture 4" descr="coffee, java icon">
             <a:extLst>
               <a:ext uri="{FF2B5EF4-FFF2-40B4-BE49-F238E27FC236}">
-                <a16:creationId xmlns="" xmlns:a16="http://schemas.microsoft.com/office/drawing/2014/main" id="{3A45186D-5BDE-4821-952B-395B754E11BA}"/>
+                <a16:creationId xmlns:a16="http://schemas.microsoft.com/office/drawing/2014/main" xmlns="" id="{3A45186D-5BDE-4821-952B-395B754E11BA}"/>
               </a:ext>
             </a:extLst>
           </p:cNvPr>
@@ -6079,7 +5692,7 @@
           <p:cNvPr id="1030" name="Picture 6" descr="interface, question, question mark icon">
             <a:extLst>
               <a:ext uri="{FF2B5EF4-FFF2-40B4-BE49-F238E27FC236}">
-                <a16:creationId xmlns="" xmlns:a16="http://schemas.microsoft.com/office/drawing/2014/main" id="{CE63EAE6-05F6-4E2E-8D66-4851CE2E02C9}"/>
+                <a16:creationId xmlns:a16="http://schemas.microsoft.com/office/drawing/2014/main" xmlns="" id="{CE63EAE6-05F6-4E2E-8D66-4851CE2E02C9}"/>
               </a:ext>
             </a:extLst>
           </p:cNvPr>
@@ -6126,7 +5739,7 @@
           <p:cNvPr id="1060" name="Picture 36" descr="html5 logo 이미지 검색결과">
             <a:extLst>
               <a:ext uri="{FF2B5EF4-FFF2-40B4-BE49-F238E27FC236}">
-                <a16:creationId xmlns="" xmlns:a16="http://schemas.microsoft.com/office/drawing/2014/main" id="{F50AA69D-C863-46C9-9222-5DF1510B5BEF}"/>
+                <a16:creationId xmlns:a16="http://schemas.microsoft.com/office/drawing/2014/main" xmlns="" id="{F50AA69D-C863-46C9-9222-5DF1510B5BEF}"/>
               </a:ext>
             </a:extLst>
           </p:cNvPr>
@@ -6173,7 +5786,7 @@
           <p:cNvPr id="33" name="Picture 6" descr="interface, question, question mark icon">
             <a:extLst>
               <a:ext uri="{FF2B5EF4-FFF2-40B4-BE49-F238E27FC236}">
-                <a16:creationId xmlns="" xmlns:a16="http://schemas.microsoft.com/office/drawing/2014/main" id="{9CA2CF39-6E47-4DA1-9BC1-BBDEB0E33204}"/>
+                <a16:creationId xmlns:a16="http://schemas.microsoft.com/office/drawing/2014/main" xmlns="" id="{9CA2CF39-6E47-4DA1-9BC1-BBDEB0E33204}"/>
               </a:ext>
             </a:extLst>
           </p:cNvPr>
@@ -6220,7 +5833,7 @@
           <p:cNvPr id="36" name="Picture 6" descr="interface, question, question mark icon">
             <a:extLst>
               <a:ext uri="{FF2B5EF4-FFF2-40B4-BE49-F238E27FC236}">
-                <a16:creationId xmlns="" xmlns:a16="http://schemas.microsoft.com/office/drawing/2014/main" id="{DD63F34C-CF83-4368-B3BC-7417BCBCB034}"/>
+                <a16:creationId xmlns:a16="http://schemas.microsoft.com/office/drawing/2014/main" xmlns="" id="{DD63F34C-CF83-4368-B3BC-7417BCBCB034}"/>
               </a:ext>
             </a:extLst>
           </p:cNvPr>
@@ -6267,7 +5880,7 @@
           <p:cNvPr id="1066" name="Picture 42" descr="eclipse icon 이미지 검색결과">
             <a:extLst>
               <a:ext uri="{FF2B5EF4-FFF2-40B4-BE49-F238E27FC236}">
-                <a16:creationId xmlns="" xmlns:a16="http://schemas.microsoft.com/office/drawing/2014/main" id="{0B4C5E08-16B7-404A-97AD-E7A33C80272C}"/>
+                <a16:creationId xmlns:a16="http://schemas.microsoft.com/office/drawing/2014/main" xmlns="" id="{0B4C5E08-16B7-404A-97AD-E7A33C80272C}"/>
               </a:ext>
             </a:extLst>
           </p:cNvPr>
@@ -6314,7 +5927,7 @@
           <p:cNvPr id="1068" name="Picture 44" descr="vscode icon 이미지 검색결과">
             <a:extLst>
               <a:ext uri="{FF2B5EF4-FFF2-40B4-BE49-F238E27FC236}">
-                <a16:creationId xmlns="" xmlns:a16="http://schemas.microsoft.com/office/drawing/2014/main" id="{B28A48A6-6AAE-4F9F-892A-2D24E44849A8}"/>
+                <a16:creationId xmlns:a16="http://schemas.microsoft.com/office/drawing/2014/main" xmlns="" id="{B28A48A6-6AAE-4F9F-892A-2D24E44849A8}"/>
               </a:ext>
             </a:extLst>
           </p:cNvPr>
@@ -6361,7 +5974,7 @@
           <p:cNvPr id="1070" name="Picture 46" descr="Tomcat 이미지 검색결과">
             <a:extLst>
               <a:ext uri="{FF2B5EF4-FFF2-40B4-BE49-F238E27FC236}">
-                <a16:creationId xmlns="" xmlns:a16="http://schemas.microsoft.com/office/drawing/2014/main" id="{38EB1361-1463-4AF3-A0FB-AC0EE18A22E0}"/>
+                <a16:creationId xmlns:a16="http://schemas.microsoft.com/office/drawing/2014/main" xmlns="" id="{38EB1361-1463-4AF3-A0FB-AC0EE18A22E0}"/>
               </a:ext>
             </a:extLst>
           </p:cNvPr>
@@ -6408,7 +6021,7 @@
           <p:cNvPr id="1072" name="Picture 48" descr="linux icon 이미지 검색결과">
             <a:extLst>
               <a:ext uri="{FF2B5EF4-FFF2-40B4-BE49-F238E27FC236}">
-                <a16:creationId xmlns="" xmlns:a16="http://schemas.microsoft.com/office/drawing/2014/main" id="{C6A216F7-BCAE-4350-B12C-76784B88C802}"/>
+                <a16:creationId xmlns:a16="http://schemas.microsoft.com/office/drawing/2014/main" xmlns="" id="{C6A216F7-BCAE-4350-B12C-76784B88C802}"/>
               </a:ext>
             </a:extLst>
           </p:cNvPr>
@@ -6455,7 +6068,7 @@
           <p:cNvPr id="44" name="직사각형 43">
             <a:extLst>
               <a:ext uri="{FF2B5EF4-FFF2-40B4-BE49-F238E27FC236}">
-                <a16:creationId xmlns="" xmlns:a16="http://schemas.microsoft.com/office/drawing/2014/main" id="{2322DCF4-0BBE-4F83-8274-DCBC69D6B063}"/>
+                <a16:creationId xmlns:a16="http://schemas.microsoft.com/office/drawing/2014/main" xmlns="" id="{2322DCF4-0BBE-4F83-8274-DCBC69D6B063}"/>
               </a:ext>
             </a:extLst>
           </p:cNvPr>
@@ -6515,7 +6128,7 @@
           <p:cNvPr id="22" name="그룹 21">
             <a:extLst>
               <a:ext uri="{FF2B5EF4-FFF2-40B4-BE49-F238E27FC236}">
-                <a16:creationId xmlns="" xmlns:a16="http://schemas.microsoft.com/office/drawing/2014/main" id="{9836D571-4022-4AC8-8918-7911496A9C0A}"/>
+                <a16:creationId xmlns:a16="http://schemas.microsoft.com/office/drawing/2014/main" xmlns="" id="{9836D571-4022-4AC8-8918-7911496A9C0A}"/>
               </a:ext>
             </a:extLst>
           </p:cNvPr>
@@ -6535,7 +6148,7 @@
             <p:cNvPr id="20" name="자유형: 도형 19">
               <a:extLst>
                 <a:ext uri="{FF2B5EF4-FFF2-40B4-BE49-F238E27FC236}">
-                  <a16:creationId xmlns="" xmlns:a16="http://schemas.microsoft.com/office/drawing/2014/main" id="{5DA8F89A-C2DB-4417-9645-A1086B61B91C}"/>
+                  <a16:creationId xmlns:a16="http://schemas.microsoft.com/office/drawing/2014/main" xmlns="" id="{5DA8F89A-C2DB-4417-9645-A1086B61B91C}"/>
                 </a:ext>
               </a:extLst>
             </p:cNvPr>
@@ -8093,7 +7706,7 @@
             <p:cNvPr id="21" name="자유형: 도형 20">
               <a:extLst>
                 <a:ext uri="{FF2B5EF4-FFF2-40B4-BE49-F238E27FC236}">
-                  <a16:creationId xmlns="" xmlns:a16="http://schemas.microsoft.com/office/drawing/2014/main" id="{7D57A43B-C5CB-4ED9-9936-E106742FE1FD}"/>
+                  <a16:creationId xmlns:a16="http://schemas.microsoft.com/office/drawing/2014/main" xmlns="" id="{7D57A43B-C5CB-4ED9-9936-E106742FE1FD}"/>
                 </a:ext>
               </a:extLst>
             </p:cNvPr>
@@ -8258,7 +7871,7 @@
           <p:cNvPr id="53" name="TextBox 52">
             <a:extLst>
               <a:ext uri="{FF2B5EF4-FFF2-40B4-BE49-F238E27FC236}">
-                <a16:creationId xmlns="" xmlns:a16="http://schemas.microsoft.com/office/drawing/2014/main" id="{4109B9DF-FF45-4C45-8CC3-ED8F45C53973}"/>
+                <a16:creationId xmlns:a16="http://schemas.microsoft.com/office/drawing/2014/main" xmlns="" id="{4109B9DF-FF45-4C45-8CC3-ED8F45C53973}"/>
               </a:ext>
             </a:extLst>
           </p:cNvPr>
@@ -8350,7 +7963,7 @@
           <p:cNvPr id="23" name="직선 연결선 22">
             <a:extLst>
               <a:ext uri="{FF2B5EF4-FFF2-40B4-BE49-F238E27FC236}">
-                <a16:creationId xmlns="" xmlns:a16="http://schemas.microsoft.com/office/drawing/2014/main" id="{0BABB3A7-1899-4C1F-A89C-35451F0C58D4}"/>
+                <a16:creationId xmlns:a16="http://schemas.microsoft.com/office/drawing/2014/main" xmlns="" id="{0BABB3A7-1899-4C1F-A89C-35451F0C58D4}"/>
               </a:ext>
             </a:extLst>
           </p:cNvPr>
@@ -8394,7 +8007,7 @@
           <p:cNvPr id="44" name="직사각형 43">
             <a:extLst>
               <a:ext uri="{FF2B5EF4-FFF2-40B4-BE49-F238E27FC236}">
-                <a16:creationId xmlns="" xmlns:a16="http://schemas.microsoft.com/office/drawing/2014/main" id="{2322DCF4-0BBE-4F83-8274-DCBC69D6B063}"/>
+                <a16:creationId xmlns:a16="http://schemas.microsoft.com/office/drawing/2014/main" xmlns="" id="{2322DCF4-0BBE-4F83-8274-DCBC69D6B063}"/>
               </a:ext>
             </a:extLst>
           </p:cNvPr>
@@ -8454,7 +8067,7 @@
           <p:cNvPr id="53" name="TextBox 52">
             <a:extLst>
               <a:ext uri="{FF2B5EF4-FFF2-40B4-BE49-F238E27FC236}">
-                <a16:creationId xmlns="" xmlns:a16="http://schemas.microsoft.com/office/drawing/2014/main" id="{4109B9DF-FF45-4C45-8CC3-ED8F45C53973}"/>
+                <a16:creationId xmlns:a16="http://schemas.microsoft.com/office/drawing/2014/main" xmlns="" id="{4109B9DF-FF45-4C45-8CC3-ED8F45C53973}"/>
               </a:ext>
             </a:extLst>
           </p:cNvPr>
@@ -8530,7 +8143,7 @@
           <p:cNvPr id="9" name="내용 개체 틀 8">
             <a:extLst>
               <a:ext uri="{FF2B5EF4-FFF2-40B4-BE49-F238E27FC236}">
-                <a16:creationId xmlns="" xmlns:a16="http://schemas.microsoft.com/office/drawing/2014/main" id="{BD4AC2F6-A548-4CED-A52E-FE99EE126014}"/>
+                <a16:creationId xmlns:a16="http://schemas.microsoft.com/office/drawing/2014/main" xmlns="" id="{BD4AC2F6-A548-4CED-A52E-FE99EE126014}"/>
               </a:ext>
             </a:extLst>
           </p:cNvPr>
@@ -8571,7 +8184,7 @@
           <p:cNvPr id="10" name="그룹 9">
             <a:extLst>
               <a:ext uri="{FF2B5EF4-FFF2-40B4-BE49-F238E27FC236}">
-                <a16:creationId xmlns="" xmlns:a16="http://schemas.microsoft.com/office/drawing/2014/main" id="{1ED3FD44-E4ED-41D8-AD0A-C40F5B152B86}"/>
+                <a16:creationId xmlns:a16="http://schemas.microsoft.com/office/drawing/2014/main" xmlns="" id="{1ED3FD44-E4ED-41D8-AD0A-C40F5B152B86}"/>
               </a:ext>
             </a:extLst>
           </p:cNvPr>
@@ -8591,7 +8204,7 @@
             <p:cNvPr id="7180" name="Picture 12" descr="Self-evaluation 이미지 검색결과">
               <a:extLst>
                 <a:ext uri="{FF2B5EF4-FFF2-40B4-BE49-F238E27FC236}">
-                  <a16:creationId xmlns="" xmlns:a16="http://schemas.microsoft.com/office/drawing/2014/main" id="{55783437-3075-4A0E-B147-A82F72250FDD}"/>
+                  <a16:creationId xmlns:a16="http://schemas.microsoft.com/office/drawing/2014/main" xmlns="" id="{55783437-3075-4A0E-B147-A82F72250FDD}"/>
                 </a:ext>
               </a:extLst>
             </p:cNvPr>
@@ -8638,7 +8251,7 @@
             <p:cNvPr id="7186" name="Picture 18">
               <a:extLst>
                 <a:ext uri="{FF2B5EF4-FFF2-40B4-BE49-F238E27FC236}">
-                  <a16:creationId xmlns="" xmlns:a16="http://schemas.microsoft.com/office/drawing/2014/main" id="{22E229D5-692D-493C-B48F-4E940E679A39}"/>
+                  <a16:creationId xmlns:a16="http://schemas.microsoft.com/office/drawing/2014/main" xmlns="" id="{22E229D5-692D-493C-B48F-4E940E679A39}"/>
                 </a:ext>
               </a:extLst>
             </p:cNvPr>
@@ -8731,7 +8344,7 @@
           <p:cNvPr id="24" name="직선 연결선 23">
             <a:extLst>
               <a:ext uri="{FF2B5EF4-FFF2-40B4-BE49-F238E27FC236}">
-                <a16:creationId xmlns="" xmlns:a16="http://schemas.microsoft.com/office/drawing/2014/main" id="{A7387644-935D-4F4F-8673-8C9C1FCF5897}"/>
+                <a16:creationId xmlns:a16="http://schemas.microsoft.com/office/drawing/2014/main" xmlns="" id="{A7387644-935D-4F4F-8673-8C9C1FCF5897}"/>
               </a:ext>
             </a:extLst>
           </p:cNvPr>
@@ -8775,7 +8388,7 @@
           <p:cNvPr id="44" name="직사각형 43">
             <a:extLst>
               <a:ext uri="{FF2B5EF4-FFF2-40B4-BE49-F238E27FC236}">
-                <a16:creationId xmlns="" xmlns:a16="http://schemas.microsoft.com/office/drawing/2014/main" id="{2322DCF4-0BBE-4F83-8274-DCBC69D6B063}"/>
+                <a16:creationId xmlns:a16="http://schemas.microsoft.com/office/drawing/2014/main" xmlns="" id="{2322DCF4-0BBE-4F83-8274-DCBC69D6B063}"/>
               </a:ext>
             </a:extLst>
           </p:cNvPr>
@@ -8835,7 +8448,7 @@
           <p:cNvPr id="53" name="TextBox 52">
             <a:extLst>
               <a:ext uri="{FF2B5EF4-FFF2-40B4-BE49-F238E27FC236}">
-                <a16:creationId xmlns="" xmlns:a16="http://schemas.microsoft.com/office/drawing/2014/main" id="{4109B9DF-FF45-4C45-8CC3-ED8F45C53973}"/>
+                <a16:creationId xmlns:a16="http://schemas.microsoft.com/office/drawing/2014/main" xmlns="" id="{4109B9DF-FF45-4C45-8CC3-ED8F45C53973}"/>
               </a:ext>
             </a:extLst>
           </p:cNvPr>
@@ -8898,7 +8511,7 @@
           <p:cNvPr id="4" name="내용 개체 틀 3">
             <a:extLst>
               <a:ext uri="{FF2B5EF4-FFF2-40B4-BE49-F238E27FC236}">
-                <a16:creationId xmlns="" xmlns:a16="http://schemas.microsoft.com/office/drawing/2014/main" id="{8259594F-C464-47CF-B369-FC9D05E303A0}"/>
+                <a16:creationId xmlns:a16="http://schemas.microsoft.com/office/drawing/2014/main" xmlns="" id="{8259594F-C464-47CF-B369-FC9D05E303A0}"/>
               </a:ext>
             </a:extLst>
           </p:cNvPr>
@@ -8942,7 +8555,7 @@
           <p:cNvPr id="5" name="그림 4">
             <a:extLst>
               <a:ext uri="{FF2B5EF4-FFF2-40B4-BE49-F238E27FC236}">
-                <a16:creationId xmlns="" xmlns:a16="http://schemas.microsoft.com/office/drawing/2014/main" id="{8B4DD8BD-5BC3-48DB-BEC9-C010F5568A3B}"/>
+                <a16:creationId xmlns:a16="http://schemas.microsoft.com/office/drawing/2014/main" xmlns="" id="{8B4DD8BD-5BC3-48DB-BEC9-C010F5568A3B}"/>
               </a:ext>
             </a:extLst>
           </p:cNvPr>
@@ -8984,7 +8597,7 @@
           <p:cNvPr id="6" name="그림 5">
             <a:extLst>
               <a:ext uri="{FF2B5EF4-FFF2-40B4-BE49-F238E27FC236}">
-                <a16:creationId xmlns="" xmlns:a16="http://schemas.microsoft.com/office/drawing/2014/main" id="{E33537B6-59F1-4FF5-94B7-3E88D5C75CB9}"/>
+                <a16:creationId xmlns:a16="http://schemas.microsoft.com/office/drawing/2014/main" xmlns="" id="{E33537B6-59F1-4FF5-94B7-3E88D5C75CB9}"/>
               </a:ext>
             </a:extLst>
           </p:cNvPr>
@@ -9026,7 +8639,7 @@
           <p:cNvPr id="7" name="그림 6">
             <a:extLst>
               <a:ext uri="{FF2B5EF4-FFF2-40B4-BE49-F238E27FC236}">
-                <a16:creationId xmlns="" xmlns:a16="http://schemas.microsoft.com/office/drawing/2014/main" id="{F905018F-2B02-48E7-A0DC-F22C944B15AC}"/>
+                <a16:creationId xmlns:a16="http://schemas.microsoft.com/office/drawing/2014/main" xmlns="" id="{F905018F-2B02-48E7-A0DC-F22C944B15AC}"/>
               </a:ext>
             </a:extLst>
           </p:cNvPr>
@@ -9296,7 +8909,7 @@
           <p:cNvPr id="97" name="직선 연결선 96">
             <a:extLst>
               <a:ext uri="{FF2B5EF4-FFF2-40B4-BE49-F238E27FC236}">
-                <a16:creationId xmlns="" xmlns:a16="http://schemas.microsoft.com/office/drawing/2014/main" id="{8DFF659A-38DA-4EA3-ABC5-5847F2132F78}"/>
+                <a16:creationId xmlns:a16="http://schemas.microsoft.com/office/drawing/2014/main" xmlns="" id="{8DFF659A-38DA-4EA3-ABC5-5847F2132F78}"/>
               </a:ext>
             </a:extLst>
           </p:cNvPr>
@@ -9340,7 +8953,7 @@
           <p:cNvPr id="4" name="그룹 3">
             <a:extLst>
               <a:ext uri="{FF2B5EF4-FFF2-40B4-BE49-F238E27FC236}">
-                <a16:creationId xmlns="" xmlns:a16="http://schemas.microsoft.com/office/drawing/2014/main" id="{E4E0C6BB-BA23-4E99-9231-783394DDDB90}"/>
+                <a16:creationId xmlns:a16="http://schemas.microsoft.com/office/drawing/2014/main" xmlns="" id="{E4E0C6BB-BA23-4E99-9231-783394DDDB90}"/>
               </a:ext>
             </a:extLst>
           </p:cNvPr>
@@ -9434,7 +9047,7 @@
             <p:cNvPr id="2050" name="Picture 2" descr="book, ebook, interactive, mobile, video icon">
               <a:extLst>
                 <a:ext uri="{FF2B5EF4-FFF2-40B4-BE49-F238E27FC236}">
-                  <a16:creationId xmlns="" xmlns:a16="http://schemas.microsoft.com/office/drawing/2014/main" id="{64DE90CC-C8FF-4389-B87B-C6846259B569}"/>
+                  <a16:creationId xmlns:a16="http://schemas.microsoft.com/office/drawing/2014/main" xmlns="" id="{64DE90CC-C8FF-4389-B87B-C6846259B569}"/>
                 </a:ext>
               </a:extLst>
             </p:cNvPr>
@@ -9489,7 +9102,7 @@
           <p:cNvPr id="78" name="직사각형 77">
             <a:extLst>
               <a:ext uri="{FF2B5EF4-FFF2-40B4-BE49-F238E27FC236}">
-                <a16:creationId xmlns="" xmlns:a16="http://schemas.microsoft.com/office/drawing/2014/main" id="{DD3AC29C-926C-4989-B8B2-DCEAE44D6EB0}"/>
+                <a16:creationId xmlns:a16="http://schemas.microsoft.com/office/drawing/2014/main" xmlns="" id="{DD3AC29C-926C-4989-B8B2-DCEAE44D6EB0}"/>
               </a:ext>
             </a:extLst>
           </p:cNvPr>
@@ -9667,7 +9280,7 @@
           <p:cNvPr id="22" name="직선 연결선 21">
             <a:extLst>
               <a:ext uri="{FF2B5EF4-FFF2-40B4-BE49-F238E27FC236}">
-                <a16:creationId xmlns="" xmlns:a16="http://schemas.microsoft.com/office/drawing/2014/main" id="{C62365F4-5F94-4454-A156-220929408803}"/>
+                <a16:creationId xmlns:a16="http://schemas.microsoft.com/office/drawing/2014/main" xmlns="" id="{C62365F4-5F94-4454-A156-220929408803}"/>
               </a:ext>
             </a:extLst>
           </p:cNvPr>
@@ -9711,7 +9324,7 @@
           <p:cNvPr id="78" name="직사각형 77">
             <a:extLst>
               <a:ext uri="{FF2B5EF4-FFF2-40B4-BE49-F238E27FC236}">
-                <a16:creationId xmlns="" xmlns:a16="http://schemas.microsoft.com/office/drawing/2014/main" id="{DD3AC29C-926C-4989-B8B2-DCEAE44D6EB0}"/>
+                <a16:creationId xmlns:a16="http://schemas.microsoft.com/office/drawing/2014/main" xmlns="" id="{DD3AC29C-926C-4989-B8B2-DCEAE44D6EB0}"/>
               </a:ext>
             </a:extLst>
           </p:cNvPr>
@@ -9766,75 +9379,12 @@
           </a:p>
         </p:txBody>
       </p:sp>
-      <p:pic>
-        <p:nvPicPr>
-          <p:cNvPr id="20" name="Picture 2">
-            <a:extLst>
-              <a:ext uri="{FF2B5EF4-FFF2-40B4-BE49-F238E27FC236}">
-                <a16:creationId xmlns="" xmlns:a16="http://schemas.microsoft.com/office/drawing/2014/main" id="{22A5777A-BB51-469C-ABCE-75B989618078}"/>
-              </a:ext>
-            </a:extLst>
-          </p:cNvPr>
-          <p:cNvPicPr>
-            <a:picLocks noChangeAspect="1" noChangeArrowheads="1"/>
-          </p:cNvPicPr>
-          <p:nvPr/>
-        </p:nvPicPr>
-        <p:blipFill rotWithShape="1">
-          <a:blip r:embed="rId2">
-            <a:extLst>
-              <a:ext uri="{28A0092B-C50C-407E-A947-70E740481C1C}">
-                <a14:useLocalDpi xmlns:a14="http://schemas.microsoft.com/office/drawing/2010/main" val="0"/>
-              </a:ext>
-            </a:extLst>
-          </a:blip>
-          <a:srcRect t="16217" r="39308" b="10789"/>
-          <a:stretch/>
-        </p:blipFill>
-        <p:spPr bwMode="auto">
-          <a:xfrm>
-            <a:off x="2713085" y="2025461"/>
-            <a:ext cx="6755646" cy="4337239"/>
-          </a:xfrm>
-          <a:prstGeom prst="rect">
-            <a:avLst/>
-          </a:prstGeom>
-          <a:noFill/>
-          <a:ln w="9525">
-            <a:solidFill>
-              <a:schemeClr val="tx1"/>
-            </a:solidFill>
-            <a:miter lim="800000"/>
-            <a:headEnd/>
-            <a:tailEnd/>
-          </a:ln>
-          <a:effectLst/>
-          <a:extLst>
-            <a:ext uri="{909E8E84-426E-40DD-AFC4-6F175D3DCCD1}">
-              <a14:hiddenFill xmlns:a14="http://schemas.microsoft.com/office/drawing/2010/main">
-                <a:solidFill>
-                  <a:schemeClr val="accent1"/>
-                </a:solidFill>
-              </a14:hiddenFill>
-            </a:ext>
-            <a:ext uri="{AF507438-7753-43E0-B8FC-AC1667EBCBE1}">
-              <a14:hiddenEffects xmlns:a14="http://schemas.microsoft.com/office/drawing/2010/main">
-                <a:effectLst>
-                  <a:outerShdw dist="35921" dir="2700000" algn="ctr" rotWithShape="0">
-                    <a:schemeClr val="bg2"/>
-                  </a:outerShdw>
-                </a:effectLst>
-              </a14:hiddenEffects>
-            </a:ext>
-          </a:extLst>
-        </p:spPr>
-      </p:pic>
       <p:sp>
         <p:nvSpPr>
           <p:cNvPr id="21" name="TextBox 20">
             <a:extLst>
               <a:ext uri="{FF2B5EF4-FFF2-40B4-BE49-F238E27FC236}">
-                <a16:creationId xmlns="" xmlns:a16="http://schemas.microsoft.com/office/drawing/2014/main" id="{7E2061A0-C4C7-49CB-8E88-C6579FAD5CCF}"/>
+                <a16:creationId xmlns:a16="http://schemas.microsoft.com/office/drawing/2014/main" xmlns="" id="{7E2061A0-C4C7-49CB-8E88-C6579FAD5CCF}"/>
               </a:ext>
             </a:extLst>
           </p:cNvPr>
@@ -9843,8 +9393,8 @@
         </p:nvSpPr>
         <p:spPr>
           <a:xfrm>
-            <a:off x="620766" y="1214975"/>
-            <a:ext cx="9996927" cy="646331"/>
+            <a:off x="620766" y="1222595"/>
+            <a:ext cx="9996927" cy="1200329"/>
           </a:xfrm>
           <a:prstGeom prst="rect">
             <a:avLst/>
@@ -9857,29 +9407,42 @@
           </a:bodyPr>
           <a:lstStyle/>
           <a:p>
-            <a:r>
-              <a:rPr lang="en-US" altLang="ko-KR" sz="3600" dirty="0">
+            <a:pPr marL="742950" indent="-742950">
+              <a:buAutoNum type="arabicPeriod"/>
+            </a:pPr>
+            <a:r>
+              <a:rPr lang="ko-KR" altLang="en-US" sz="3600" dirty="0" smtClean="0">
                 <a:solidFill>
                   <a:srgbClr val="E8C193"/>
                 </a:solidFill>
               </a:rPr>
-              <a:t>1. </a:t>
-            </a:r>
-            <a:r>
-              <a:rPr lang="ko-KR" altLang="en-US" sz="3600" dirty="0">
+              <a:t>강의 서비스 제공 </a:t>
+            </a:r>
+            <a:endParaRPr lang="en-US" altLang="ko-KR" sz="3600" dirty="0" smtClean="0">
+              <a:solidFill>
+                <a:srgbClr val="E8C193"/>
+              </a:solidFill>
+            </a:endParaRPr>
+          </a:p>
+          <a:p>
+            <a:pPr marL="742950" indent="-742950">
+              <a:buAutoNum type="arabicPeriod"/>
+            </a:pPr>
+            <a:r>
+              <a:rPr lang="ko-KR" altLang="en-US" sz="3600" dirty="0" smtClean="0">
                 <a:solidFill>
                   <a:srgbClr val="E8C193"/>
                 </a:solidFill>
               </a:rPr>
-              <a:t>이론과 관련 실습을 </a:t>
-            </a:r>
-            <a:r>
-              <a:rPr lang="ko-KR" altLang="en-US" sz="3600" dirty="0" smtClean="0">
+              <a:t>코딩문제 </a:t>
+            </a:r>
+            <a:r>
+              <a:rPr lang="ko-KR" altLang="en-US" sz="3600" smtClean="0">
                 <a:solidFill>
                   <a:srgbClr val="E8C193"/>
                 </a:solidFill>
               </a:rPr>
-              <a:t>한 화면에서 제공</a:t>
+              <a:t>서비스 제공</a:t>
             </a:r>
             <a:endParaRPr lang="ko-KR" altLang="en-US" sz="3600" dirty="0">
               <a:solidFill>
@@ -9939,7 +9502,7 @@
           <p:cNvPr id="22" name="직선 연결선 21">
             <a:extLst>
               <a:ext uri="{FF2B5EF4-FFF2-40B4-BE49-F238E27FC236}">
-                <a16:creationId xmlns="" xmlns:a16="http://schemas.microsoft.com/office/drawing/2014/main" id="{C62365F4-5F94-4454-A156-220929408803}"/>
+                <a16:creationId xmlns:a16="http://schemas.microsoft.com/office/drawing/2014/main" xmlns="" id="{C62365F4-5F94-4454-A156-220929408803}"/>
               </a:ext>
             </a:extLst>
           </p:cNvPr>
@@ -9983,7 +9546,7 @@
           <p:cNvPr id="78" name="직사각형 77">
             <a:extLst>
               <a:ext uri="{FF2B5EF4-FFF2-40B4-BE49-F238E27FC236}">
-                <a16:creationId xmlns="" xmlns:a16="http://schemas.microsoft.com/office/drawing/2014/main" id="{DD3AC29C-926C-4989-B8B2-DCEAE44D6EB0}"/>
+                <a16:creationId xmlns:a16="http://schemas.microsoft.com/office/drawing/2014/main" xmlns="" id="{DD3AC29C-926C-4989-B8B2-DCEAE44D6EB0}"/>
               </a:ext>
             </a:extLst>
           </p:cNvPr>
@@ -10015,20 +9578,12 @@
               <a:defRPr/>
             </a:pPr>
             <a:r>
-              <a:rPr lang="ko-KR" altLang="en-US" sz="4400" b="1" kern="0" dirty="0">
+              <a:rPr lang="en-US" altLang="ko-KR" sz="4400" b="1" kern="0" dirty="0">
                 <a:solidFill>
                   <a:srgbClr val="E8C193"/>
                 </a:solidFill>
               </a:rPr>
-              <a:t>목표</a:t>
-            </a:r>
-            <a:r>
-              <a:rPr lang="en-US" altLang="ko-KR" sz="1600" b="1" kern="0" dirty="0">
-                <a:solidFill>
-                  <a:srgbClr val="E8C193"/>
-                </a:solidFill>
-              </a:rPr>
-              <a:t>1/1</a:t>
+              <a:t>Q &amp; A</a:t>
             </a:r>
             <a:endParaRPr lang="ko-KR" altLang="en-US" sz="11500" b="1" kern="0" dirty="0">
               <a:solidFill>
@@ -10038,137 +9593,10 @@
           </a:p>
         </p:txBody>
       </p:sp>
-      <p:sp>
-        <p:nvSpPr>
-          <p:cNvPr id="21" name="TextBox 20">
-            <a:extLst>
-              <a:ext uri="{FF2B5EF4-FFF2-40B4-BE49-F238E27FC236}">
-                <a16:creationId xmlns="" xmlns:a16="http://schemas.microsoft.com/office/drawing/2014/main" id="{7E2061A0-C4C7-49CB-8E88-C6579FAD5CCF}"/>
-              </a:ext>
-            </a:extLst>
-          </p:cNvPr>
-          <p:cNvSpPr txBox="1"/>
-          <p:nvPr/>
-        </p:nvSpPr>
-        <p:spPr>
-          <a:xfrm>
-            <a:off x="620766" y="1214975"/>
-            <a:ext cx="9996927" cy="646331"/>
-          </a:xfrm>
-          <a:prstGeom prst="rect">
-            <a:avLst/>
-          </a:prstGeom>
-          <a:noFill/>
-        </p:spPr>
-        <p:txBody>
-          <a:bodyPr wrap="square" rtlCol="0">
-            <a:spAutoFit/>
-          </a:bodyPr>
-          <a:lstStyle/>
-          <a:p>
-            <a:r>
-              <a:rPr lang="en-US" altLang="ko-KR" sz="3600" dirty="0">
-                <a:solidFill>
-                  <a:srgbClr val="E8C193"/>
-                </a:solidFill>
-              </a:rPr>
-              <a:t>2. </a:t>
-            </a:r>
-            <a:r>
-              <a:rPr lang="ko-KR" altLang="en-US" sz="3600" dirty="0">
-                <a:solidFill>
-                  <a:srgbClr val="E8C193"/>
-                </a:solidFill>
-              </a:rPr>
-              <a:t>온라인 </a:t>
-            </a:r>
-            <a:r>
-              <a:rPr lang="ko-KR" altLang="en-US" sz="3600" dirty="0" smtClean="0">
-                <a:solidFill>
-                  <a:srgbClr val="E8C193"/>
-                </a:solidFill>
-              </a:rPr>
-              <a:t>편집기</a:t>
-            </a:r>
-            <a:r>
-              <a:rPr lang="en-US" altLang="ko-KR" sz="3600" dirty="0" smtClean="0">
-                <a:solidFill>
-                  <a:srgbClr val="E8C193"/>
-                </a:solidFill>
-              </a:rPr>
-              <a:t>/</a:t>
-            </a:r>
-            <a:r>
-              <a:rPr lang="ko-KR" altLang="en-US" sz="3600" dirty="0" smtClean="0">
-                <a:solidFill>
-                  <a:srgbClr val="E8C193"/>
-                </a:solidFill>
-              </a:rPr>
-              <a:t>컴파일</a:t>
-            </a:r>
-            <a:r>
-              <a:rPr lang="en-US" altLang="ko-KR" sz="3600" dirty="0" smtClean="0">
-                <a:solidFill>
-                  <a:srgbClr val="E8C193"/>
-                </a:solidFill>
-              </a:rPr>
-              <a:t>/</a:t>
-            </a:r>
-            <a:r>
-              <a:rPr lang="ko-KR" altLang="en-US" sz="3600" dirty="0" smtClean="0">
-                <a:solidFill>
-                  <a:srgbClr val="E8C193"/>
-                </a:solidFill>
-              </a:rPr>
-              <a:t>실행 환경 제공</a:t>
-            </a:r>
-            <a:endParaRPr lang="ko-KR" altLang="en-US" sz="3600" dirty="0">
-              <a:solidFill>
-                <a:srgbClr val="E8C193"/>
-              </a:solidFill>
-            </a:endParaRPr>
-          </a:p>
-        </p:txBody>
-      </p:sp>
-      <p:pic>
-        <p:nvPicPr>
-          <p:cNvPr id="2" name="그림 1">
-            <a:extLst>
-              <a:ext uri="{FF2B5EF4-FFF2-40B4-BE49-F238E27FC236}">
-                <a16:creationId xmlns="" xmlns:a16="http://schemas.microsoft.com/office/drawing/2014/main" id="{E78C3CE8-E48D-4EF0-B5FE-C5E76E926BB6}"/>
-              </a:ext>
-            </a:extLst>
-          </p:cNvPr>
-          <p:cNvPicPr>
-            <a:picLocks noChangeAspect="1"/>
-          </p:cNvPicPr>
-          <p:nvPr/>
-        </p:nvPicPr>
-        <p:blipFill>
-          <a:blip r:embed="rId2"/>
-          <a:stretch>
-            <a:fillRect/>
-          </a:stretch>
-        </p:blipFill>
-        <p:spPr>
-          <a:xfrm>
-            <a:off x="2719797" y="2011808"/>
-            <a:ext cx="6751228" cy="4303267"/>
-          </a:xfrm>
-          <a:prstGeom prst="rect">
-            <a:avLst/>
-          </a:prstGeom>
-          <a:ln>
-            <a:solidFill>
-              <a:schemeClr val="tx1"/>
-            </a:solidFill>
-          </a:ln>
-        </p:spPr>
-      </p:pic>
     </p:spTree>
     <p:extLst>
       <p:ext uri="{BB962C8B-B14F-4D97-AF65-F5344CB8AC3E}">
-        <p14:creationId xmlns:p14="http://schemas.microsoft.com/office/powerpoint/2010/main" val="3227847526"/>
+        <p14:creationId xmlns:p14="http://schemas.microsoft.com/office/powerpoint/2010/main" val="4227714645"/>
       </p:ext>
     </p:extLst>
   </p:cSld>
@@ -10440,7 +9868,7 @@
   <a:extraClrSchemeLst/>
   <a:extLst>
     <a:ext uri="{05A4C25C-085E-4340-85A3-A5531E510DB2}">
-      <thm15:themeFamily xmlns="" xmlns:thm15="http://schemas.microsoft.com/office/thememl/2012/main" name="Office Theme" id="{62F939B6-93AF-4DB8-9C6B-D6C7DFDC589F}" vid="{4A3C46E8-61CC-4603-A589-7422A47A8E4A}"/>
+      <thm15:themeFamily xmlns:thm15="http://schemas.microsoft.com/office/thememl/2012/main" xmlns="" name="Office Theme" id="{62F939B6-93AF-4DB8-9C6B-D6C7DFDC589F}" vid="{4A3C46E8-61CC-4603-A589-7422A47A8E4A}"/>
     </a:ext>
   </a:extLst>
 </a:theme>

</xml_diff>